<commit_message>
Added all the pictures needed for the MVP to the 'TechnicalDocumentation.md'
</commit_message>
<xml_diff>
--- a/MVP/MVP Presentation.pptx
+++ b/MVP/MVP Presentation.pptx
@@ -5,17 +5,13 @@
     <p:sldMasterId id="2147483678" r:id="rId1"/>
   </p:sldMasterIdLst>
   <p:notesMasterIdLst>
-    <p:notesMasterId r:id="rId10"/>
+    <p:notesMasterId r:id="rId6"/>
   </p:notesMasterIdLst>
   <p:sldIdLst>
-    <p:sldId id="256" r:id="rId2"/>
-    <p:sldId id="257" r:id="rId3"/>
-    <p:sldId id="265" r:id="rId4"/>
-    <p:sldId id="261" r:id="rId5"/>
-    <p:sldId id="258" r:id="rId6"/>
-    <p:sldId id="259" r:id="rId7"/>
-    <p:sldId id="263" r:id="rId8"/>
-    <p:sldId id="264" r:id="rId9"/>
+    <p:sldId id="257" r:id="rId2"/>
+    <p:sldId id="265" r:id="rId3"/>
+    <p:sldId id="261" r:id="rId4"/>
+    <p:sldId id="264" r:id="rId5"/>
   </p:sldIdLst>
   <p:sldSz cx="12192000" cy="6858000"/>
   <p:notesSz cx="6858000" cy="9144000"/>
@@ -625,7 +621,7 @@
           <a:p>
             <a:fld id="{BB0EFA0C-2783-471D-8939-2BE70A2A34FC}" type="slidenum">
               <a:rPr lang="en-GB" smtClean="0"/>
-              <a:t>2</a:t>
+              <a:t>1</a:t>
             </a:fld>
             <a:endParaRPr lang="en-GB"/>
           </a:p>
@@ -3884,15 +3880,15 @@
           <p:cNvPr id="2" name="Title 1">
             <a:extLst>
               <a:ext uri="{FF2B5EF4-FFF2-40B4-BE49-F238E27FC236}">
-                <a16:creationId xmlns:a16="http://schemas.microsoft.com/office/drawing/2014/main" id="{15171BE8-ED78-4E97-8C21-8D8486F958E0}"/>
-              </a:ext>
-            </a:extLst>
-          </p:cNvPr>
-          <p:cNvSpPr>
-            <a:spLocks noGrp="1"/>
-          </p:cNvSpPr>
-          <p:nvPr>
-            <p:ph type="ctrTitle"/>
+                <a16:creationId xmlns:a16="http://schemas.microsoft.com/office/drawing/2014/main" id="{D83C7985-6ABA-441A-9120-1D02C047D66A}"/>
+              </a:ext>
+            </a:extLst>
+          </p:cNvPr>
+          <p:cNvSpPr>
+            <a:spLocks noGrp="1"/>
+          </p:cNvSpPr>
+          <p:nvPr>
+            <p:ph type="title"/>
           </p:nvPr>
         </p:nvSpPr>
         <p:spPr/>
@@ -3902,35 +3898,177 @@
           <a:p>
             <a:r>
               <a:rPr lang="en-GB" dirty="0"/>
-              <a:t>Capstone Project</a:t>
-            </a:r>
-          </a:p>
-        </p:txBody>
-      </p:sp>
-      <p:sp>
-        <p:nvSpPr>
-          <p:cNvPr id="3" name="Subtitle 2">
-            <a:extLst>
-              <a:ext uri="{FF2B5EF4-FFF2-40B4-BE49-F238E27FC236}">
-                <a16:creationId xmlns:a16="http://schemas.microsoft.com/office/drawing/2014/main" id="{885090C7-1DD9-4C90-86BD-A44C5A3B1365}"/>
-              </a:ext>
-            </a:extLst>
-          </p:cNvPr>
-          <p:cNvSpPr>
-            <a:spLocks noGrp="1"/>
-          </p:cNvSpPr>
-          <p:nvPr>
-            <p:ph type="subTitle" idx="1"/>
-          </p:nvPr>
-        </p:nvSpPr>
-        <p:spPr/>
-        <p:txBody>
-          <a:bodyPr/>
-          <a:lstStyle/>
-          <a:p>
+              <a:t>Background</a:t>
+            </a:r>
+          </a:p>
+        </p:txBody>
+      </p:sp>
+      <p:pic>
+        <p:nvPicPr>
+          <p:cNvPr id="2050" name="Picture 2">
+            <a:extLst>
+              <a:ext uri="{FF2B5EF4-FFF2-40B4-BE49-F238E27FC236}">
+                <a16:creationId xmlns:a16="http://schemas.microsoft.com/office/drawing/2014/main" id="{6F7CD84D-3F4D-40E9-BA8A-124D2BA9F255}"/>
+              </a:ext>
+            </a:extLst>
+          </p:cNvPr>
+          <p:cNvPicPr>
+            <a:picLocks noGrp="1" noChangeAspect="1" noChangeArrowheads="1"/>
+          </p:cNvPicPr>
+          <p:nvPr>
+            <p:ph idx="1"/>
+          </p:nvPr>
+        </p:nvPicPr>
+        <p:blipFill>
+          <a:blip r:embed="rId3">
+            <a:extLst>
+              <a:ext uri="{28A0092B-C50C-407E-A947-70E740481C1C}">
+                <a14:useLocalDpi xmlns:a14="http://schemas.microsoft.com/office/drawing/2010/main" val="0"/>
+              </a:ext>
+            </a:extLst>
+          </a:blip>
+          <a:srcRect/>
+          <a:stretch>
+            <a:fillRect/>
+          </a:stretch>
+        </p:blipFill>
+        <p:spPr bwMode="auto">
+          <a:xfrm>
+            <a:off x="938212" y="1990003"/>
+            <a:ext cx="6296206" cy="3537961"/>
+          </a:xfrm>
+          <a:prstGeom prst="rect">
+            <a:avLst/>
+          </a:prstGeom>
+          <a:noFill/>
+          <a:extLst>
+            <a:ext uri="{909E8E84-426E-40DD-AFC4-6F175D3DCCD1}">
+              <a14:hiddenFill xmlns:a14="http://schemas.microsoft.com/office/drawing/2010/main">
+                <a:solidFill>
+                  <a:srgbClr val="FFFFFF"/>
+                </a:solidFill>
+              </a14:hiddenFill>
+            </a:ext>
+          </a:extLst>
+        </p:spPr>
+      </p:pic>
+      <p:sp>
+        <p:nvSpPr>
+          <p:cNvPr id="5" name="TextBox 4">
+            <a:extLst>
+              <a:ext uri="{FF2B5EF4-FFF2-40B4-BE49-F238E27FC236}">
+                <a16:creationId xmlns:a16="http://schemas.microsoft.com/office/drawing/2014/main" id="{1673775F-1CB5-409D-BCDB-23A7D8C863F5}"/>
+              </a:ext>
+            </a:extLst>
+          </p:cNvPr>
+          <p:cNvSpPr txBox="1"/>
+          <p:nvPr/>
+        </p:nvSpPr>
+        <p:spPr>
+          <a:xfrm>
+            <a:off x="7703957" y="1990003"/>
+            <a:ext cx="3921986" cy="4524315"/>
+          </a:xfrm>
+          <a:prstGeom prst="rect">
+            <a:avLst/>
+          </a:prstGeom>
+          <a:noFill/>
+        </p:spPr>
+        <p:txBody>
+          <a:bodyPr wrap="square" rtlCol="0">
+            <a:spAutoFit/>
+          </a:bodyPr>
+          <a:lstStyle/>
+          <a:p>
+            <a:pPr marL="285750" indent="-285750">
+              <a:buFont typeface="Arial" panose="020B0604020202020204" pitchFamily="34" charset="0"/>
+              <a:buChar char="•"/>
+            </a:pPr>
             <a:r>
               <a:rPr lang="en-GB" dirty="0"/>
-              <a:t>By Ajaya Rai (AJ)</a:t>
+              <a:t>“Brotherhood fascinates me.”</a:t>
+            </a:r>
+          </a:p>
+          <a:p>
+            <a:pPr marL="285750" indent="-285750">
+              <a:buFont typeface="Arial" panose="020B0604020202020204" pitchFamily="34" charset="0"/>
+              <a:buChar char="•"/>
+            </a:pPr>
+            <a:r>
+              <a:rPr lang="en-GB" dirty="0"/>
+              <a:t>What is brotherhood? </a:t>
+            </a:r>
+          </a:p>
+          <a:p>
+            <a:pPr marL="285750" indent="-285750">
+              <a:buFont typeface="Arial" panose="020B0604020202020204" pitchFamily="34" charset="0"/>
+              <a:buChar char="•"/>
+            </a:pPr>
+            <a:r>
+              <a:rPr lang="en-GB" dirty="0"/>
+              <a:t>Adv/Disadv of brotherhood -&gt; It’s amoral. Positively using it; e.g. self improvement.</a:t>
+            </a:r>
+          </a:p>
+          <a:p>
+            <a:pPr marL="285750" indent="-285750">
+              <a:buFont typeface="Arial" panose="020B0604020202020204" pitchFamily="34" charset="0"/>
+              <a:buChar char="•"/>
+            </a:pPr>
+            <a:r>
+              <a:rPr lang="en-GB" dirty="0"/>
+              <a:t>Why brotherhood lost in our society? -&gt; Two evolution: Maximise individual gain + Community</a:t>
+            </a:r>
+          </a:p>
+          <a:p>
+            <a:pPr marL="285750" indent="-285750">
+              <a:buFont typeface="Arial" panose="020B0604020202020204" pitchFamily="34" charset="0"/>
+              <a:buChar char="•"/>
+            </a:pPr>
+            <a:r>
+              <a:rPr lang="en-GB" dirty="0"/>
+              <a:t>How have others gone about creating the brotherhood within our society? -&gt; Using initiative, e.g. sleeping over to neighbour house, seeing existing friends who are like minded, finding existing group else creating your own.</a:t>
+            </a:r>
+          </a:p>
+          <a:p>
+            <a:pPr marL="285750" indent="-285750">
+              <a:buFontTx/>
+              <a:buChar char="-"/>
+            </a:pPr>
+            <a:endParaRPr lang="en-GB" dirty="0"/>
+          </a:p>
+        </p:txBody>
+      </p:sp>
+      <p:sp>
+        <p:nvSpPr>
+          <p:cNvPr id="3" name="TextBox 2">
+            <a:extLst>
+              <a:ext uri="{FF2B5EF4-FFF2-40B4-BE49-F238E27FC236}">
+                <a16:creationId xmlns:a16="http://schemas.microsoft.com/office/drawing/2014/main" id="{0D74DD5D-2D82-4F08-8DE8-7B94A3B8F2EB}"/>
+              </a:ext>
+            </a:extLst>
+          </p:cNvPr>
+          <p:cNvSpPr txBox="1"/>
+          <p:nvPr/>
+        </p:nvSpPr>
+        <p:spPr>
+          <a:xfrm>
+            <a:off x="838199" y="5571269"/>
+            <a:ext cx="1154863" cy="369332"/>
+          </a:xfrm>
+          <a:prstGeom prst="rect">
+            <a:avLst/>
+          </a:prstGeom>
+          <a:noFill/>
+        </p:spPr>
+        <p:txBody>
+          <a:bodyPr wrap="square" rtlCol="0">
+            <a:spAutoFit/>
+          </a:bodyPr>
+          <a:lstStyle/>
+          <a:p>
+            <a:r>
+              <a:rPr lang="en-GB" dirty="0"/>
+              <a:t>Ref: [999]</a:t>
             </a:r>
           </a:p>
         </p:txBody>
@@ -3938,7 +4076,7 @@
     </p:spTree>
     <p:extLst>
       <p:ext uri="{BB962C8B-B14F-4D97-AF65-F5344CB8AC3E}">
-        <p14:creationId xmlns:p14="http://schemas.microsoft.com/office/powerpoint/2010/main" val="837591222"/>
+        <p14:creationId xmlns:p14="http://schemas.microsoft.com/office/powerpoint/2010/main" val="2688071013"/>
       </p:ext>
     </p:extLst>
   </p:cSld>
@@ -3970,234 +4108,6 @@
           <p:cNvPr id="2" name="Title 1">
             <a:extLst>
               <a:ext uri="{FF2B5EF4-FFF2-40B4-BE49-F238E27FC236}">
-                <a16:creationId xmlns:a16="http://schemas.microsoft.com/office/drawing/2014/main" id="{D83C7985-6ABA-441A-9120-1D02C047D66A}"/>
-              </a:ext>
-            </a:extLst>
-          </p:cNvPr>
-          <p:cNvSpPr>
-            <a:spLocks noGrp="1"/>
-          </p:cNvSpPr>
-          <p:nvPr>
-            <p:ph type="title"/>
-          </p:nvPr>
-        </p:nvSpPr>
-        <p:spPr/>
-        <p:txBody>
-          <a:bodyPr/>
-          <a:lstStyle/>
-          <a:p>
-            <a:r>
-              <a:rPr lang="en-GB" dirty="0"/>
-              <a:t>Background</a:t>
-            </a:r>
-          </a:p>
-        </p:txBody>
-      </p:sp>
-      <p:pic>
-        <p:nvPicPr>
-          <p:cNvPr id="2050" name="Picture 2">
-            <a:extLst>
-              <a:ext uri="{FF2B5EF4-FFF2-40B4-BE49-F238E27FC236}">
-                <a16:creationId xmlns:a16="http://schemas.microsoft.com/office/drawing/2014/main" id="{6F7CD84D-3F4D-40E9-BA8A-124D2BA9F255}"/>
-              </a:ext>
-            </a:extLst>
-          </p:cNvPr>
-          <p:cNvPicPr>
-            <a:picLocks noGrp="1" noChangeAspect="1" noChangeArrowheads="1"/>
-          </p:cNvPicPr>
-          <p:nvPr>
-            <p:ph idx="1"/>
-          </p:nvPr>
-        </p:nvPicPr>
-        <p:blipFill>
-          <a:blip r:embed="rId3">
-            <a:extLst>
-              <a:ext uri="{28A0092B-C50C-407E-A947-70E740481C1C}">
-                <a14:useLocalDpi xmlns:a14="http://schemas.microsoft.com/office/drawing/2010/main" val="0"/>
-              </a:ext>
-            </a:extLst>
-          </a:blip>
-          <a:srcRect/>
-          <a:stretch>
-            <a:fillRect/>
-          </a:stretch>
-        </p:blipFill>
-        <p:spPr bwMode="auto">
-          <a:xfrm>
-            <a:off x="938212" y="1990003"/>
-            <a:ext cx="6296206" cy="3537961"/>
-          </a:xfrm>
-          <a:prstGeom prst="rect">
-            <a:avLst/>
-          </a:prstGeom>
-          <a:noFill/>
-          <a:extLst>
-            <a:ext uri="{909E8E84-426E-40DD-AFC4-6F175D3DCCD1}">
-              <a14:hiddenFill xmlns:a14="http://schemas.microsoft.com/office/drawing/2010/main">
-                <a:solidFill>
-                  <a:srgbClr val="FFFFFF"/>
-                </a:solidFill>
-              </a14:hiddenFill>
-            </a:ext>
-          </a:extLst>
-        </p:spPr>
-      </p:pic>
-      <p:sp>
-        <p:nvSpPr>
-          <p:cNvPr id="5" name="TextBox 4">
-            <a:extLst>
-              <a:ext uri="{FF2B5EF4-FFF2-40B4-BE49-F238E27FC236}">
-                <a16:creationId xmlns:a16="http://schemas.microsoft.com/office/drawing/2014/main" id="{1673775F-1CB5-409D-BCDB-23A7D8C863F5}"/>
-              </a:ext>
-            </a:extLst>
-          </p:cNvPr>
-          <p:cNvSpPr txBox="1"/>
-          <p:nvPr/>
-        </p:nvSpPr>
-        <p:spPr>
-          <a:xfrm>
-            <a:off x="7703957" y="1990003"/>
-            <a:ext cx="3921986" cy="4524315"/>
-          </a:xfrm>
-          <a:prstGeom prst="rect">
-            <a:avLst/>
-          </a:prstGeom>
-          <a:noFill/>
-        </p:spPr>
-        <p:txBody>
-          <a:bodyPr wrap="square" rtlCol="0">
-            <a:spAutoFit/>
-          </a:bodyPr>
-          <a:lstStyle/>
-          <a:p>
-            <a:pPr marL="285750" indent="-285750">
-              <a:buFont typeface="Arial" panose="020B0604020202020204" pitchFamily="34" charset="0"/>
-              <a:buChar char="•"/>
-            </a:pPr>
-            <a:r>
-              <a:rPr lang="en-GB" dirty="0"/>
-              <a:t>“Brotherhood fascinates me.”</a:t>
-            </a:r>
-          </a:p>
-          <a:p>
-            <a:pPr marL="285750" indent="-285750">
-              <a:buFont typeface="Arial" panose="020B0604020202020204" pitchFamily="34" charset="0"/>
-              <a:buChar char="•"/>
-            </a:pPr>
-            <a:r>
-              <a:rPr lang="en-GB" dirty="0"/>
-              <a:t>What is brotherhood? </a:t>
-            </a:r>
-          </a:p>
-          <a:p>
-            <a:pPr marL="285750" indent="-285750">
-              <a:buFont typeface="Arial" panose="020B0604020202020204" pitchFamily="34" charset="0"/>
-              <a:buChar char="•"/>
-            </a:pPr>
-            <a:r>
-              <a:rPr lang="en-GB" dirty="0"/>
-              <a:t>Adv/Disadv of brotherhood -&gt; It’s amoral. Positively using it; e.g. self improvement.</a:t>
-            </a:r>
-          </a:p>
-          <a:p>
-            <a:pPr marL="285750" indent="-285750">
-              <a:buFont typeface="Arial" panose="020B0604020202020204" pitchFamily="34" charset="0"/>
-              <a:buChar char="•"/>
-            </a:pPr>
-            <a:r>
-              <a:rPr lang="en-GB" dirty="0"/>
-              <a:t>Why brotherhood lost in our society? -&gt; Two evolution: Maximise individual gain + Community</a:t>
-            </a:r>
-          </a:p>
-          <a:p>
-            <a:pPr marL="285750" indent="-285750">
-              <a:buFont typeface="Arial" panose="020B0604020202020204" pitchFamily="34" charset="0"/>
-              <a:buChar char="•"/>
-            </a:pPr>
-            <a:r>
-              <a:rPr lang="en-GB" dirty="0"/>
-              <a:t>How have others gone about creating the brotherhood within our society? -&gt; Using initiative, e.g. sleeping over to neighbour house, seeing existing friends who are like minded, finding existing group else creating your own.</a:t>
-            </a:r>
-          </a:p>
-          <a:p>
-            <a:pPr marL="285750" indent="-285750">
-              <a:buFontTx/>
-              <a:buChar char="-"/>
-            </a:pPr>
-            <a:endParaRPr lang="en-GB" dirty="0"/>
-          </a:p>
-        </p:txBody>
-      </p:sp>
-      <p:sp>
-        <p:nvSpPr>
-          <p:cNvPr id="3" name="TextBox 2">
-            <a:extLst>
-              <a:ext uri="{FF2B5EF4-FFF2-40B4-BE49-F238E27FC236}">
-                <a16:creationId xmlns:a16="http://schemas.microsoft.com/office/drawing/2014/main" id="{0D74DD5D-2D82-4F08-8DE8-7B94A3B8F2EB}"/>
-              </a:ext>
-            </a:extLst>
-          </p:cNvPr>
-          <p:cNvSpPr txBox="1"/>
-          <p:nvPr/>
-        </p:nvSpPr>
-        <p:spPr>
-          <a:xfrm>
-            <a:off x="838199" y="5571269"/>
-            <a:ext cx="1154863" cy="369332"/>
-          </a:xfrm>
-          <a:prstGeom prst="rect">
-            <a:avLst/>
-          </a:prstGeom>
-          <a:noFill/>
-        </p:spPr>
-        <p:txBody>
-          <a:bodyPr wrap="square" rtlCol="0">
-            <a:spAutoFit/>
-          </a:bodyPr>
-          <a:lstStyle/>
-          <a:p>
-            <a:r>
-              <a:rPr lang="en-GB" dirty="0"/>
-              <a:t>Ref: [999]</a:t>
-            </a:r>
-          </a:p>
-        </p:txBody>
-      </p:sp>
-    </p:spTree>
-    <p:extLst>
-      <p:ext uri="{BB962C8B-B14F-4D97-AF65-F5344CB8AC3E}">
-        <p14:creationId xmlns:p14="http://schemas.microsoft.com/office/powerpoint/2010/main" val="2688071013"/>
-      </p:ext>
-    </p:extLst>
-  </p:cSld>
-  <p:clrMapOvr>
-    <a:masterClrMapping/>
-  </p:clrMapOvr>
-</p:sld>
-</file>
-
-<file path=ppt/slides/slide3.xml><?xml version="1.0" encoding="utf-8"?>
-<p:sld xmlns:a="http://schemas.openxmlformats.org/drawingml/2006/main" xmlns:r="http://schemas.openxmlformats.org/officeDocument/2006/relationships" xmlns:p="http://schemas.openxmlformats.org/presentationml/2006/main">
-  <p:cSld>
-    <p:spTree>
-      <p:nvGrpSpPr>
-        <p:cNvPr id="1" name=""/>
-        <p:cNvGrpSpPr/>
-        <p:nvPr/>
-      </p:nvGrpSpPr>
-      <p:grpSpPr>
-        <a:xfrm>
-          <a:off x="0" y="0"/>
-          <a:ext cx="0" cy="0"/>
-          <a:chOff x="0" y="0"/>
-          <a:chExt cx="0" cy="0"/>
-        </a:xfrm>
-      </p:grpSpPr>
-      <p:sp>
-        <p:nvSpPr>
-          <p:cNvPr id="2" name="Title 1">
-            <a:extLst>
-              <a:ext uri="{FF2B5EF4-FFF2-40B4-BE49-F238E27FC236}">
                 <a16:creationId xmlns:a16="http://schemas.microsoft.com/office/drawing/2014/main" id="{1D3F6D51-FC9D-4DB0-BA8C-3C057C3352B7}"/>
               </a:ext>
             </a:extLst>
@@ -4303,7 +4213,7 @@
 </p:sld>
 </file>
 
-<file path=ppt/slides/slide4.xml><?xml version="1.0" encoding="utf-8"?>
+<file path=ppt/slides/slide3.xml><?xml version="1.0" encoding="utf-8"?>
 <p:sld xmlns:a="http://schemas.openxmlformats.org/drawingml/2006/main" xmlns:r="http://schemas.openxmlformats.org/officeDocument/2006/relationships" xmlns:p="http://schemas.openxmlformats.org/presentationml/2006/main">
   <p:cSld>
     <p:spTree>
@@ -5581,8 +5491,8 @@
         </p:nvSpPr>
         <p:spPr>
           <a:xfrm>
-            <a:off x="2175413" y="126052"/>
-            <a:ext cx="10515600" cy="1325563"/>
+            <a:off x="4303471" y="88663"/>
+            <a:ext cx="5178580" cy="1325563"/>
           </a:xfrm>
         </p:spPr>
         <p:txBody>
@@ -5591,7 +5501,7 @@
           <a:p>
             <a:r>
               <a:rPr lang="en-GB" dirty="0"/>
-              <a:t>End Of The Year Product Target</a:t>
+              <a:t>Project description</a:t>
             </a:r>
           </a:p>
         </p:txBody>
@@ -5609,243 +5519,7 @@
 </p:sld>
 </file>
 
-<file path=ppt/slides/slide5.xml><?xml version="1.0" encoding="utf-8"?>
-<p:sld xmlns:a="http://schemas.openxmlformats.org/drawingml/2006/main" xmlns:r="http://schemas.openxmlformats.org/officeDocument/2006/relationships" xmlns:p="http://schemas.openxmlformats.org/presentationml/2006/main">
-  <p:cSld>
-    <p:spTree>
-      <p:nvGrpSpPr>
-        <p:cNvPr id="1" name=""/>
-        <p:cNvGrpSpPr/>
-        <p:nvPr/>
-      </p:nvGrpSpPr>
-      <p:grpSpPr>
-        <a:xfrm>
-          <a:off x="0" y="0"/>
-          <a:ext cx="0" cy="0"/>
-          <a:chOff x="0" y="0"/>
-          <a:chExt cx="0" cy="0"/>
-        </a:xfrm>
-      </p:grpSpPr>
-      <p:sp>
-        <p:nvSpPr>
-          <p:cNvPr id="2" name="Title 1">
-            <a:extLst>
-              <a:ext uri="{FF2B5EF4-FFF2-40B4-BE49-F238E27FC236}">
-                <a16:creationId xmlns:a16="http://schemas.microsoft.com/office/drawing/2014/main" id="{566AFC4D-A5B3-4CD2-A9C3-C69BE64D1655}"/>
-              </a:ext>
-            </a:extLst>
-          </p:cNvPr>
-          <p:cNvSpPr>
-            <a:spLocks noGrp="1"/>
-          </p:cNvSpPr>
-          <p:nvPr>
-            <p:ph type="title"/>
-          </p:nvPr>
-        </p:nvSpPr>
-        <p:spPr/>
-        <p:txBody>
-          <a:bodyPr/>
-          <a:lstStyle/>
-          <a:p>
-            <a:r>
-              <a:rPr lang="en-GB" dirty="0"/>
-              <a:t>MVP target</a:t>
-            </a:r>
-          </a:p>
-        </p:txBody>
-      </p:sp>
-      <p:sp>
-        <p:nvSpPr>
-          <p:cNvPr id="3" name="Content Placeholder 2">
-            <a:extLst>
-              <a:ext uri="{FF2B5EF4-FFF2-40B4-BE49-F238E27FC236}">
-                <a16:creationId xmlns:a16="http://schemas.microsoft.com/office/drawing/2014/main" id="{11345F70-3F1E-46BD-8788-9B488FAF2239}"/>
-              </a:ext>
-            </a:extLst>
-          </p:cNvPr>
-          <p:cNvSpPr>
-            <a:spLocks noGrp="1"/>
-          </p:cNvSpPr>
-          <p:nvPr>
-            <p:ph idx="1"/>
-          </p:nvPr>
-        </p:nvSpPr>
-        <p:spPr/>
-        <p:txBody>
-          <a:bodyPr/>
-          <a:lstStyle/>
-          <a:p>
-            <a:r>
-              <a:rPr lang="en-GB" dirty="0"/>
-              <a:t>Focus on getting the logic done</a:t>
-            </a:r>
-          </a:p>
-        </p:txBody>
-      </p:sp>
-    </p:spTree>
-    <p:extLst>
-      <p:ext uri="{BB962C8B-B14F-4D97-AF65-F5344CB8AC3E}">
-        <p14:creationId xmlns:p14="http://schemas.microsoft.com/office/powerpoint/2010/main" val="1785269706"/>
-      </p:ext>
-    </p:extLst>
-  </p:cSld>
-  <p:clrMapOvr>
-    <a:masterClrMapping/>
-  </p:clrMapOvr>
-</p:sld>
-</file>
-
-<file path=ppt/slides/slide6.xml><?xml version="1.0" encoding="utf-8"?>
-<p:sld xmlns:a="http://schemas.openxmlformats.org/drawingml/2006/main" xmlns:r="http://schemas.openxmlformats.org/officeDocument/2006/relationships" xmlns:p="http://schemas.openxmlformats.org/presentationml/2006/main">
-  <p:cSld>
-    <p:spTree>
-      <p:nvGrpSpPr>
-        <p:cNvPr id="1" name=""/>
-        <p:cNvGrpSpPr/>
-        <p:nvPr/>
-      </p:nvGrpSpPr>
-      <p:grpSpPr>
-        <a:xfrm>
-          <a:off x="0" y="0"/>
-          <a:ext cx="0" cy="0"/>
-          <a:chOff x="0" y="0"/>
-          <a:chExt cx="0" cy="0"/>
-        </a:xfrm>
-      </p:grpSpPr>
-      <p:sp>
-        <p:nvSpPr>
-          <p:cNvPr id="2" name="Title 1">
-            <a:extLst>
-              <a:ext uri="{FF2B5EF4-FFF2-40B4-BE49-F238E27FC236}">
-                <a16:creationId xmlns:a16="http://schemas.microsoft.com/office/drawing/2014/main" id="{02DE2B63-F1CC-4EB5-878E-6870E3911355}"/>
-              </a:ext>
-            </a:extLst>
-          </p:cNvPr>
-          <p:cNvSpPr>
-            <a:spLocks noGrp="1"/>
-          </p:cNvSpPr>
-          <p:nvPr>
-            <p:ph type="title"/>
-          </p:nvPr>
-        </p:nvSpPr>
-        <p:spPr/>
-        <p:txBody>
-          <a:bodyPr/>
-          <a:lstStyle/>
-          <a:p>
-            <a:r>
-              <a:rPr lang="en-GB" dirty="0"/>
-              <a:t>Technical Achievement</a:t>
-            </a:r>
-          </a:p>
-        </p:txBody>
-      </p:sp>
-      <p:sp>
-        <p:nvSpPr>
-          <p:cNvPr id="3" name="Content Placeholder 2">
-            <a:extLst>
-              <a:ext uri="{FF2B5EF4-FFF2-40B4-BE49-F238E27FC236}">
-                <a16:creationId xmlns:a16="http://schemas.microsoft.com/office/drawing/2014/main" id="{3ECCC8F2-E718-46DD-8470-6B78D18D3873}"/>
-              </a:ext>
-            </a:extLst>
-          </p:cNvPr>
-          <p:cNvSpPr>
-            <a:spLocks noGrp="1"/>
-          </p:cNvSpPr>
-          <p:nvPr>
-            <p:ph idx="1"/>
-          </p:nvPr>
-        </p:nvSpPr>
-        <p:spPr/>
-        <p:txBody>
-          <a:bodyPr/>
-          <a:lstStyle/>
-          <a:p>
-            <a:r>
-              <a:rPr lang="en-GB" dirty="0"/>
-              <a:t>Demonstration</a:t>
-            </a:r>
-          </a:p>
-        </p:txBody>
-      </p:sp>
-    </p:spTree>
-    <p:extLst>
-      <p:ext uri="{BB962C8B-B14F-4D97-AF65-F5344CB8AC3E}">
-        <p14:creationId xmlns:p14="http://schemas.microsoft.com/office/powerpoint/2010/main" val="1950086364"/>
-      </p:ext>
-    </p:extLst>
-  </p:cSld>
-  <p:clrMapOvr>
-    <a:masterClrMapping/>
-  </p:clrMapOvr>
-</p:sld>
-</file>
-
-<file path=ppt/slides/slide7.xml><?xml version="1.0" encoding="utf-8"?>
-<p:sld xmlns:a="http://schemas.openxmlformats.org/drawingml/2006/main" xmlns:r="http://schemas.openxmlformats.org/officeDocument/2006/relationships" xmlns:p="http://schemas.openxmlformats.org/presentationml/2006/main">
-  <p:cSld>
-    <p:spTree>
-      <p:nvGrpSpPr>
-        <p:cNvPr id="1" name=""/>
-        <p:cNvGrpSpPr/>
-        <p:nvPr/>
-      </p:nvGrpSpPr>
-      <p:grpSpPr>
-        <a:xfrm>
-          <a:off x="0" y="0"/>
-          <a:ext cx="0" cy="0"/>
-          <a:chOff x="0" y="0"/>
-          <a:chExt cx="0" cy="0"/>
-        </a:xfrm>
-      </p:grpSpPr>
-      <p:sp>
-        <p:nvSpPr>
-          <p:cNvPr id="2" name="Title 1">
-            <a:extLst>
-              <a:ext uri="{FF2B5EF4-FFF2-40B4-BE49-F238E27FC236}">
-                <a16:creationId xmlns:a16="http://schemas.microsoft.com/office/drawing/2014/main" id="{FC8E0E28-1CCF-49F0-8C77-2E7A50417E56}"/>
-              </a:ext>
-            </a:extLst>
-          </p:cNvPr>
-          <p:cNvSpPr>
-            <a:spLocks noGrp="1"/>
-          </p:cNvSpPr>
-          <p:nvPr>
-            <p:ph type="title"/>
-          </p:nvPr>
-        </p:nvSpPr>
-        <p:spPr>
-          <a:xfrm>
-            <a:off x="553476" y="2538879"/>
-            <a:ext cx="10515600" cy="1325563"/>
-          </a:xfrm>
-        </p:spPr>
-        <p:txBody>
-          <a:bodyPr/>
-          <a:lstStyle/>
-          <a:p>
-            <a:pPr algn="ctr"/>
-            <a:r>
-              <a:rPr lang="en-GB" dirty="0"/>
-              <a:t>Questions?</a:t>
-            </a:r>
-          </a:p>
-        </p:txBody>
-      </p:sp>
-    </p:spTree>
-    <p:extLst>
-      <p:ext uri="{BB962C8B-B14F-4D97-AF65-F5344CB8AC3E}">
-        <p14:creationId xmlns:p14="http://schemas.microsoft.com/office/powerpoint/2010/main" val="1814036287"/>
-      </p:ext>
-    </p:extLst>
-  </p:cSld>
-  <p:clrMapOvr>
-    <a:masterClrMapping/>
-  </p:clrMapOvr>
-</p:sld>
-</file>
-
-<file path=ppt/slides/slide8.xml><?xml version="1.0" encoding="utf-8"?>
+<file path=ppt/slides/slide4.xml><?xml version="1.0" encoding="utf-8"?>
 <p:sld xmlns:a="http://schemas.openxmlformats.org/drawingml/2006/main" xmlns:r="http://schemas.openxmlformats.org/officeDocument/2006/relationships" xmlns:p="http://schemas.openxmlformats.org/presentationml/2006/main">
   <p:cSld>
     <p:spTree>

</xml_diff>